<commit_message>
week-3, week-5 latex errors are fixed
</commit_message>
<xml_diff>
--- a/docs/week-5/ce100-week-5-dp.md_word.pptx
+++ b/docs/week-5/ce100-week-5-dp.md_word.pptx
@@ -4270,13 +4270,180 @@
                 <a:pPr lvl="0" indent="0" marL="0">
                   <a:buNone/>
                 </a:pPr>
-                <a:r>
-                  <a:rPr/>
-                  <a:t>$$
-F(0)=0 \text{ and } F(1)=1 \\
-F(n)=F(n-1)+F(n-2)
-$$</a:t>
-                </a:r>
+                <a14:m>
+                  <m:oMathPara xmlns:m="http://schemas.openxmlformats.org/officeDocument/2006/math">
+                    <m:oMathParaPr>
+                      <m:jc m:val="center"/>
+                    </m:oMathParaPr>
+                    <m:oMath>
+                      <m:m>
+                        <m:mPr>
+                          <m:baseJc m:val="center"/>
+                          <m:plcHide m:val="1"/>
+                          <m:mcs>
+                            <m:mc>
+                              <m:mcPr>
+                                <m:mcJc m:val="right"/>
+                                <m:count m:val="1"/>
+                              </m:mcPr>
+                            </m:mc>
+                            <m:mc>
+                              <m:mcPr>
+                                <m:mcJc m:val="left"/>
+                                <m:count m:val="1"/>
+                              </m:mcPr>
+                            </m:mc>
+                          </m:mcs>
+                        </m:mPr>
+                        <m:mr>
+                          <m:e/>
+                          <m:e>
+                            <m:r>
+                              <m:t>F</m:t>
+                            </m:r>
+                            <m:d>
+                              <m:dPr>
+                                <m:begChr m:val="("/>
+                                <m:endChr m:val=")"/>
+                                <m:sepChr m:val=""/>
+                                <m:grow/>
+                              </m:dPr>
+                              <m:e>
+                                <m:r>
+                                  <m:t>0</m:t>
+                                </m:r>
+                              </m:e>
+                            </m:d>
+                            <m:r>
+                              <m:rPr>
+                                <m:sty m:val="p"/>
+                              </m:rPr>
+                              <m:t>=</m:t>
+                            </m:r>
+                            <m:r>
+                              <m:t>0</m:t>
+                            </m:r>
+                            <m:r>
+                              <m:rPr>
+                                <m:nor/>
+                                <m:sty m:val="p"/>
+                              </m:rPr>
+                              <m:t> and </m:t>
+                            </m:r>
+                            <m:r>
+                              <m:t>F</m:t>
+                            </m:r>
+                            <m:d>
+                              <m:dPr>
+                                <m:begChr m:val="("/>
+                                <m:endChr m:val=")"/>
+                                <m:sepChr m:val=""/>
+                                <m:grow/>
+                              </m:dPr>
+                              <m:e>
+                                <m:r>
+                                  <m:t>1</m:t>
+                                </m:r>
+                              </m:e>
+                            </m:d>
+                            <m:r>
+                              <m:rPr>
+                                <m:sty m:val="p"/>
+                              </m:rPr>
+                              <m:t>=</m:t>
+                            </m:r>
+                            <m:r>
+                              <m:t>1</m:t>
+                            </m:r>
+                          </m:e>
+                        </m:mr>
+                        <m:mr>
+                          <m:e/>
+                          <m:e>
+                            <m:r>
+                              <m:t>F</m:t>
+                            </m:r>
+                            <m:d>
+                              <m:dPr>
+                                <m:begChr m:val="("/>
+                                <m:endChr m:val=")"/>
+                                <m:sepChr m:val=""/>
+                                <m:grow/>
+                              </m:dPr>
+                              <m:e>
+                                <m:r>
+                                  <m:t>n</m:t>
+                                </m:r>
+                              </m:e>
+                            </m:d>
+                            <m:r>
+                              <m:rPr>
+                                <m:sty m:val="p"/>
+                              </m:rPr>
+                              <m:t>=</m:t>
+                            </m:r>
+                            <m:r>
+                              <m:t>F</m:t>
+                            </m:r>
+                            <m:d>
+                              <m:dPr>
+                                <m:begChr m:val="("/>
+                                <m:endChr m:val=")"/>
+                                <m:sepChr m:val=""/>
+                                <m:grow/>
+                              </m:dPr>
+                              <m:e>
+                                <m:r>
+                                  <m:t>n</m:t>
+                                </m:r>
+                                <m:r>
+                                  <m:rPr>
+                                    <m:sty m:val="p"/>
+                                  </m:rPr>
+                                  <m:t>−</m:t>
+                                </m:r>
+                                <m:r>
+                                  <m:t>1</m:t>
+                                </m:r>
+                              </m:e>
+                            </m:d>
+                            <m:r>
+                              <m:rPr>
+                                <m:sty m:val="p"/>
+                              </m:rPr>
+                              <m:t>+</m:t>
+                            </m:r>
+                            <m:r>
+                              <m:t>F</m:t>
+                            </m:r>
+                            <m:d>
+                              <m:dPr>
+                                <m:begChr m:val="("/>
+                                <m:endChr m:val=")"/>
+                                <m:sepChr m:val=""/>
+                                <m:grow/>
+                              </m:dPr>
+                              <m:e>
+                                <m:r>
+                                  <m:t>n</m:t>
+                                </m:r>
+                                <m:r>
+                                  <m:rPr>
+                                    <m:sty m:val="p"/>
+                                  </m:rPr>
+                                  <m:t>−</m:t>
+                                </m:r>
+                                <m:r>
+                                  <m:t>2</m:t>
+                                </m:r>
+                              </m:e>
+                            </m:d>
+                          </m:e>
+                        </m:mr>
+                      </m:m>
+                    </m:oMath>
+                  </m:oMathPara>
+                </a14:m>
               </a:p>
               <a:p>
                 <a:pPr lvl="0"/>

</xml_diff>

<commit_message>
mathjax nested align aligned error fixed in week-5
</commit_message>
<xml_diff>
--- a/docs/week-5/ce100-week-5-dp.md_word.pptx
+++ b/docs/week-5/ce100-week-5-dp.md_word.pptx
@@ -19535,18 +19535,20 @@
                   <a:t>$$
 m_{ij}=\underset{i \leq k &lt; j}{MIN} \{ m_{ik} + m_{k+1,j} + p_{i-1} p_k p_j \} \\[10pt]
 \begin{align*}
+\begin{aligned}
 A_1 &amp;: (30 \times 35) \\
 A_2 &amp;: (35 \times 15) \\
 A_3 &amp;: (15 \times 5) \\
 A_4 &amp;: (5 \times 10) \\
 A_5 &amp;: (10 \times 20) \\
 A_6 &amp;: (20 \times 25)
-\end{align*}
-\begin{align*}
+\end{aligned}
+\begin{aligned}
 &amp; ((A_2)\overbrace{\vdots}^{ (k=2) } (A_3 A_4 A_5)) \\[10 pt]
 \quad cost &amp;= m_{22} + m_{35} + p_1p_2p_5 \\
 &amp;= 0 + 2500 + 35 \times 15 \times 20 \\
 &amp;= 13000
+\end{aligned}
 \end{align*}
 $$</a:t>
                 </a:r>
@@ -19741,18 +19743,20 @@
                   <a:t>$$
 m_{ij}=\underset{i \leq k &lt; j}{MIN} \{ m_{ik} + m_{k+1,j} + p_{i-1} p_k p_j \} \\[10pt]
 \begin{align*}
+\begin{aligned}
 A_1 &amp;: (30 \times 35) \\
 A_2 &amp;: (35 \times 15) \\
 A_3 &amp;: (15 \times 5) \\
 A_4 &amp;: (5 \times 10) \\
 A_5 &amp;: (10 \times 20) \\
 A_6 &amp;: (20 \times 25)
-\end{align*}
-\begin{align*}
+\end{aligned}
+\begin{aligned}
 &amp; ((A_2 A_3) \overbrace{\vdots}^{ (k=3) } (A_4 A_5)) \\[10 pt]
 \quad cost &amp;= m_{23} + m_{45} + p_1p_3p_5 \\
 &amp;= 2625 + 1000 + 35 \times 5 \times 20 \\
 &amp;= 7125
+\end{aligned}
 \end{align*}
 $$</a:t>
                 </a:r>
@@ -19947,18 +19951,20 @@
                   <a:t>$$
 m_{ij}=\underset{i \leq k &lt; j}{MIN} \{ m_{ik} + m_{k+1,j} + p_{i-1} p_k p_j \} \\[10pt]
 \begin{align*}
+\begin{aligned}
 A_1 &amp;: (30 \times 35) \\
 A_2 &amp;: (35 \times 15) \\
 A_3 &amp;: (15 \times 5) \\
 A_4 &amp;: (5 \times 10) \\
 A_5 &amp;: (10 \times 20) \\
 A_6 &amp;: (20 \times 25)
-\end{align*}
-\begin{align*}
+\end{aligned}
+\begin{aligned}
 &amp; ((A_2 A_3 A_4)\overbrace{\vdots}^{ (k=4) }(A_5)) \\[10 pt]
 \quad cost &amp;= m_{24} + m_{55} + p_1p_4p_5 \\
 &amp;= 4375 + 0 + 35 \times 10 \times 20 \\
 &amp;= 11375
+\end{aligned}
 \end{align*}
 $$</a:t>
                 </a:r>
@@ -20150,7 +20156,7 @@
                 </a:pPr>
                 <a:r>
                   <a:rPr/>
-                  <a:t>$$ m_{ij}= { m_{ik} + m_{k+1,j} + p_{i-1} p_k p_j } \[10pt]   </a:t>
+                  <a:t>$$ m_{ij}= { m_{ik} + m_{k+1,j} + p_{i-1} p_k p_j } \[10pt] </a:t>
                 </a:r>
               </a:p>
               <a:p>

</xml_diff>